<commit_message>
Releasing lec 24 materials
</commit_message>
<xml_diff>
--- a/tyler/meena/cs220/f20/materials/lec_24_F20.pptx
+++ b/tyler/meena/cs220/f20/materials/lec_24_F20.pptx
@@ -10892,11 +10892,32 @@
               <a:defRPr sz="2200" b="0"/>
             </a:pPr>
             <a:r>
+              <a:rPr lang="en-US" dirty="0"/>
+              <a:t>	</a:t>
+            </a:r>
+            <a:r>
+              <a:rPr dirty="0"/>
               <a:t>Should we </a:t>
             </a:r>
             <a:r>
-              <a:rPr i="1"/>
-              <a:t>"introduce another new keyword (say, gen or generator) in place of def"?</a:t>
+              <a:rPr i="1" dirty="0"/>
+              <a:t>"introduce another new </a:t>
+            </a:r>
+            <a:r>
+              <a:rPr lang="en-US" i="1" dirty="0"/>
+              <a:t>	</a:t>
+            </a:r>
+            <a:r>
+              <a:rPr i="1" dirty="0"/>
+              <a:t>keyword (say, gen or generator) in place </a:t>
+            </a:r>
+            <a:r>
+              <a:rPr lang="en-US" i="1" dirty="0"/>
+              <a:t>	</a:t>
+            </a:r>
+            <a:r>
+              <a:rPr i="1" dirty="0"/>
+              <a:t>of def"?</a:t>
             </a:r>
           </a:p>
         </p:txBody>
@@ -11610,10 +11631,15 @@
               <a:defRPr sz="2100" b="0"/>
             </a:pPr>
             <a:r>
+              <a:rPr lang="en-US" dirty="0"/>
+              <a:t>	</a:t>
+            </a:r>
+            <a:r>
+              <a:rPr dirty="0"/>
               <a:t>Argument for </a:t>
             </a:r>
             <a:r>
-              <a:rPr>
+              <a:rPr dirty="0">
                 <a:latin typeface="Courier"/>
                 <a:ea typeface="Courier"/>
                 <a:cs typeface="Courier"/>
@@ -11622,11 +11648,28 @@
               <a:t>def</a:t>
             </a:r>
             <a:r>
+              <a:rPr dirty="0"/>
               <a:t>: </a:t>
             </a:r>
             <a:r>
+              <a:rPr i="1" dirty="0"/>
+              <a:t>"generators are functions, </a:t>
+            </a:r>
+            <a:r>
               <a:rPr i="1"/>
-              <a:t>"generators are functions, but with the twist that they're resumable"</a:t>
+              <a:t>but </a:t>
+            </a:r>
+            <a:r>
+              <a:rPr lang="en-US" i="1"/>
+              <a:t>	</a:t>
+            </a:r>
+            <a:r>
+              <a:rPr i="1"/>
+              <a:t>with </a:t>
+            </a:r>
+            <a:r>
+              <a:rPr i="1" dirty="0"/>
+              <a:t>the twist that they're resumable"</a:t>
             </a:r>
           </a:p>
         </p:txBody>
@@ -11731,10 +11774,15 @@
               <a:defRPr sz="2100" b="0"/>
             </a:pPr>
             <a:r>
+              <a:rPr lang="en-US" dirty="0"/>
+              <a:t>	</a:t>
+            </a:r>
+            <a:r>
+              <a:rPr dirty="0"/>
               <a:t>Argument for </a:t>
             </a:r>
             <a:r>
-              <a:rPr>
+              <a:rPr dirty="0">
                 <a:latin typeface="Courier"/>
                 <a:ea typeface="Courier"/>
                 <a:cs typeface="Courier"/>
@@ -11743,10 +11791,11 @@
               <a:t>gen</a:t>
             </a:r>
             <a:r>
+              <a:rPr dirty="0"/>
               <a:t>: </a:t>
             </a:r>
             <a:r>
-              <a:rPr i="1"/>
+              <a:rPr i="1" dirty="0"/>
               <a:t>"a yield statement buried</a:t>
             </a:r>
           </a:p>
@@ -11755,8 +11804,20 @@
               <a:defRPr sz="2100" b="0"/>
             </a:pPr>
             <a:r>
-              <a:rPr i="1"/>
-              <a:t>in the body is not enough warning that the semantics are so different"</a:t>
+              <a:rPr lang="en-US" i="1" dirty="0"/>
+              <a:t>	</a:t>
+            </a:r>
+            <a:r>
+              <a:rPr i="1" dirty="0"/>
+              <a:t>in the body is not enough warning that the semantics </a:t>
+            </a:r>
+            <a:r>
+              <a:rPr lang="en-US" i="1" dirty="0"/>
+              <a:t>	</a:t>
+            </a:r>
+            <a:r>
+              <a:rPr i="1" dirty="0"/>
+              <a:t>are so different"</a:t>
             </a:r>
           </a:p>
         </p:txBody>
@@ -12284,6 +12345,10 @@
               <a:defRPr sz="2100" b="0"/>
             </a:pPr>
             <a:r>
+              <a:rPr lang="en-US"/>
+              <a:t>	</a:t>
+            </a:r>
+            <a:r>
               <a:t>Argument for </a:t>
             </a:r>
             <a:r>
@@ -12300,7 +12365,15 @@
             </a:r>
             <a:r>
               <a:rPr i="1"/>
-              <a:t>"generators are functions, but with the twist that they're resumable"</a:t>
+              <a:t>"generators are functions, but </a:t>
+            </a:r>
+            <a:r>
+              <a:rPr lang="en-US" i="1"/>
+              <a:t>	</a:t>
+            </a:r>
+            <a:r>
+              <a:rPr i="1"/>
+              <a:t>with the twist that they're resumable"</a:t>
             </a:r>
           </a:p>
         </p:txBody>
@@ -12405,10 +12478,15 @@
               <a:defRPr sz="2100" b="0"/>
             </a:pPr>
             <a:r>
+              <a:rPr lang="en-US" dirty="0"/>
+              <a:t>	</a:t>
+            </a:r>
+            <a:r>
+              <a:rPr dirty="0"/>
               <a:t>Argument for </a:t>
             </a:r>
             <a:r>
-              <a:rPr>
+              <a:rPr dirty="0">
                 <a:latin typeface="Courier"/>
                 <a:ea typeface="Courier"/>
                 <a:cs typeface="Courier"/>
@@ -12417,10 +12495,11 @@
               <a:t>gen</a:t>
             </a:r>
             <a:r>
+              <a:rPr dirty="0"/>
               <a:t>: </a:t>
             </a:r>
             <a:r>
-              <a:rPr i="1"/>
+              <a:rPr i="1" dirty="0"/>
               <a:t>"a yield statement buried</a:t>
             </a:r>
           </a:p>
@@ -12429,8 +12508,20 @@
               <a:defRPr sz="2100" b="0"/>
             </a:pPr>
             <a:r>
-              <a:rPr i="1"/>
-              <a:t>in the body is not enough warning that the semantics are so different"</a:t>
+              <a:rPr lang="en-US" i="1" dirty="0"/>
+              <a:t>	i</a:t>
+            </a:r>
+            <a:r>
+              <a:rPr i="1" dirty="0"/>
+              <a:t>n the body is not enough warning that the semantics </a:t>
+            </a:r>
+            <a:r>
+              <a:rPr lang="en-US" i="1" dirty="0"/>
+              <a:t>	</a:t>
+            </a:r>
+            <a:r>
+              <a:rPr i="1" dirty="0"/>
+              <a:t>are so different"</a:t>
             </a:r>
           </a:p>
         </p:txBody>

</xml_diff>